<commit_message>
Node MySQl Create New Project
Node MySQl Create New Project
</commit_message>
<xml_diff>
--- a/PowerPointSlides/9.pptx
+++ b/PowerPointSlides/9.pptx
@@ -16,6 +16,7 @@
     <p:sldId id="282" r:id="rId10"/>
     <p:sldId id="283" r:id="rId11"/>
     <p:sldId id="284" r:id="rId12"/>
+    <p:sldId id="285" r:id="rId13"/>
   </p:sldIdLst>
   <p:sldSz cx="9144000" cy="5143500" type="screen16x9"/>
   <p:notesSz cx="6858000" cy="9144000"/>
@@ -299,7 +300,7 @@
             <a:fld id="{1D8BD707-D9CF-40AE-B4C6-C98DA3205C09}" type="datetimeFigureOut">
               <a:rPr lang="en-US" smtClean="0"/>
               <a:pPr/>
-              <a:t>7/12/2020</a:t>
+              <a:t>9/17/2020</a:t>
             </a:fld>
             <a:endParaRPr lang="en-US"/>
           </a:p>
@@ -466,7 +467,7 @@
             <a:fld id="{1D8BD707-D9CF-40AE-B4C6-C98DA3205C09}" type="datetimeFigureOut">
               <a:rPr lang="en-US" smtClean="0"/>
               <a:pPr/>
-              <a:t>7/12/2020</a:t>
+              <a:t>9/17/2020</a:t>
             </a:fld>
             <a:endParaRPr lang="en-US"/>
           </a:p>
@@ -643,7 +644,7 @@
             <a:fld id="{1D8BD707-D9CF-40AE-B4C6-C98DA3205C09}" type="datetimeFigureOut">
               <a:rPr lang="en-US" smtClean="0"/>
               <a:pPr/>
-              <a:t>7/12/2020</a:t>
+              <a:t>9/17/2020</a:t>
             </a:fld>
             <a:endParaRPr lang="en-US"/>
           </a:p>
@@ -810,7 +811,7 @@
             <a:fld id="{1D8BD707-D9CF-40AE-B4C6-C98DA3205C09}" type="datetimeFigureOut">
               <a:rPr lang="en-US" smtClean="0"/>
               <a:pPr/>
-              <a:t>7/12/2020</a:t>
+              <a:t>9/17/2020</a:t>
             </a:fld>
             <a:endParaRPr lang="en-US"/>
           </a:p>
@@ -1053,7 +1054,7 @@
             <a:fld id="{1D8BD707-D9CF-40AE-B4C6-C98DA3205C09}" type="datetimeFigureOut">
               <a:rPr lang="en-US" smtClean="0"/>
               <a:pPr/>
-              <a:t>7/12/2020</a:t>
+              <a:t>9/17/2020</a:t>
             </a:fld>
             <a:endParaRPr lang="en-US"/>
           </a:p>
@@ -1338,7 +1339,7 @@
             <a:fld id="{1D8BD707-D9CF-40AE-B4C6-C98DA3205C09}" type="datetimeFigureOut">
               <a:rPr lang="en-US" smtClean="0"/>
               <a:pPr/>
-              <a:t>7/12/2020</a:t>
+              <a:t>9/17/2020</a:t>
             </a:fld>
             <a:endParaRPr lang="en-US"/>
           </a:p>
@@ -1757,7 +1758,7 @@
             <a:fld id="{1D8BD707-D9CF-40AE-B4C6-C98DA3205C09}" type="datetimeFigureOut">
               <a:rPr lang="en-US" smtClean="0"/>
               <a:pPr/>
-              <a:t>7/12/2020</a:t>
+              <a:t>9/17/2020</a:t>
             </a:fld>
             <a:endParaRPr lang="en-US"/>
           </a:p>
@@ -1872,7 +1873,7 @@
             <a:fld id="{1D8BD707-D9CF-40AE-B4C6-C98DA3205C09}" type="datetimeFigureOut">
               <a:rPr lang="en-US" smtClean="0"/>
               <a:pPr/>
-              <a:t>7/12/2020</a:t>
+              <a:t>9/17/2020</a:t>
             </a:fld>
             <a:endParaRPr lang="en-US"/>
           </a:p>
@@ -1964,7 +1965,7 @@
             <a:fld id="{1D8BD707-D9CF-40AE-B4C6-C98DA3205C09}" type="datetimeFigureOut">
               <a:rPr lang="en-US" smtClean="0"/>
               <a:pPr/>
-              <a:t>7/12/2020</a:t>
+              <a:t>9/17/2020</a:t>
             </a:fld>
             <a:endParaRPr lang="en-US"/>
           </a:p>
@@ -2238,7 +2239,7 @@
             <a:fld id="{1D8BD707-D9CF-40AE-B4C6-C98DA3205C09}" type="datetimeFigureOut">
               <a:rPr lang="en-US" smtClean="0"/>
               <a:pPr/>
-              <a:t>7/12/2020</a:t>
+              <a:t>9/17/2020</a:t>
             </a:fld>
             <a:endParaRPr lang="en-US"/>
           </a:p>
@@ -2488,7 +2489,7 @@
             <a:fld id="{1D8BD707-D9CF-40AE-B4C6-C98DA3205C09}" type="datetimeFigureOut">
               <a:rPr lang="en-US" smtClean="0"/>
               <a:pPr/>
-              <a:t>7/12/2020</a:t>
+              <a:t>9/17/2020</a:t>
             </a:fld>
             <a:endParaRPr lang="en-US"/>
           </a:p>
@@ -2707,7 +2708,7 @@
             <a:fld id="{1D8BD707-D9CF-40AE-B4C6-C98DA3205C09}" type="datetimeFigureOut">
               <a:rPr lang="en-US" smtClean="0"/>
               <a:pPr/>
-              <a:t>7/12/2020</a:t>
+              <a:t>9/17/2020</a:t>
             </a:fld>
             <a:endParaRPr lang="en-US"/>
           </a:p>
@@ -5688,6 +5689,97 @@
 </p:sld>
 </file>
 
+<file path=ppt/slides/slide12.xml><?xml version="1.0" encoding="utf-8"?>
+<p:sld xmlns:a="http://schemas.openxmlformats.org/drawingml/2006/main" xmlns:r="http://schemas.openxmlformats.org/officeDocument/2006/relationships" xmlns:p="http://schemas.openxmlformats.org/presentationml/2006/main">
+  <p:cSld>
+    <p:bg>
+      <p:bgPr>
+        <a:blipFill dpi="0" rotWithShape="1">
+          <a:blip r:embed="rId2">
+            <a:lum/>
+          </a:blip>
+          <a:srcRect/>
+          <a:stretch>
+            <a:fillRect/>
+          </a:stretch>
+        </a:blipFill>
+        <a:effectLst/>
+      </p:bgPr>
+    </p:bg>
+    <p:spTree>
+      <p:nvGrpSpPr>
+        <p:cNvPr id="1" name=""/>
+        <p:cNvGrpSpPr/>
+        <p:nvPr/>
+      </p:nvGrpSpPr>
+      <p:grpSpPr>
+        <a:xfrm>
+          <a:off x="0" y="0"/>
+          <a:ext cx="0" cy="0"/>
+          <a:chOff x="0" y="0"/>
+          <a:chExt cx="0" cy="0"/>
+        </a:xfrm>
+      </p:grpSpPr>
+      <p:sp>
+        <p:nvSpPr>
+          <p:cNvPr id="8" name="TextBox 7"/>
+          <p:cNvSpPr txBox="1"/>
+          <p:nvPr/>
+        </p:nvSpPr>
+        <p:spPr>
+          <a:xfrm>
+            <a:off x="762000" y="128885"/>
+            <a:ext cx="1773242" cy="461665"/>
+          </a:xfrm>
+          <a:prstGeom prst="rect">
+            <a:avLst/>
+          </a:prstGeom>
+          <a:noFill/>
+        </p:spPr>
+        <p:txBody>
+          <a:bodyPr wrap="none" rtlCol="0">
+            <a:spAutoFit/>
+          </a:bodyPr>
+          <a:lstStyle/>
+          <a:p>
+            <a:r>
+              <a:rPr lang="en-US" sz="2400" dirty="0" smtClean="0">
+                <a:solidFill>
+                  <a:srgbClr val="00B050"/>
+                </a:solidFill>
+                <a:latin typeface="Bahnschrift Light Condensed" pitchFamily="34" charset="0"/>
+              </a:rPr>
+              <a:t>Node js website</a:t>
+            </a:r>
+            <a:endParaRPr lang="en-US" sz="2400" dirty="0">
+              <a:solidFill>
+                <a:schemeClr val="bg1"/>
+              </a:solidFill>
+              <a:latin typeface="Bahnschrift Condensed" pitchFamily="34" charset="0"/>
+            </a:endParaRPr>
+          </a:p>
+        </p:txBody>
+      </p:sp>
+    </p:spTree>
+    <p:extLst>
+      <p:ext uri="{BB962C8B-B14F-4D97-AF65-F5344CB8AC3E}">
+        <p14:creationId xmlns:p14="http://schemas.microsoft.com/office/powerpoint/2010/main" val="1844450721"/>
+      </p:ext>
+    </p:extLst>
+  </p:cSld>
+  <p:clrMapOvr>
+    <a:masterClrMapping/>
+  </p:clrMapOvr>
+  <p:timing>
+    <p:tnLst>
+      <p:par>
+        <p:cTn id="1" dur="indefinite" restart="never" nodeType="tmRoot"/>
+      </p:par>
+    </p:tnLst>
+  </p:timing>
+</p:sld>
+</file>
+
 <file path=ppt/slides/slide2.xml><?xml version="1.0" encoding="utf-8"?>
 <p:sld xmlns:a="http://schemas.openxmlformats.org/drawingml/2006/main" xmlns:r="http://schemas.openxmlformats.org/officeDocument/2006/relationships" xmlns:p="http://schemas.openxmlformats.org/presentationml/2006/main">
   <p:cSld>

</xml_diff>